<commit_message>
Aggiornamento immagine e presentazione
</commit_message>
<xml_diff>
--- a/Progetto Ingegneria SW.pptx
+++ b/Progetto Ingegneria SW.pptx
@@ -1381,7 +1381,7 @@
             <a:pPr rtl="0"/>
             <a:fld id="{BEFBFAFD-B367-4FDC-8BD6-0ED3AC1E8171}" type="datetime1">
               <a:rPr lang="it-IT" smtClean="0"/>
-              <a:t>30/05/2019</a:t>
+              <a:t>04/06/2019</a:t>
             </a:fld>
             <a:endParaRPr lang="it-IT" dirty="0"/>
           </a:p>
@@ -1563,7 +1563,7 @@
             <a:fld id="{358ABC55-7EA4-4B04-948D-8B6AA303BF20}" type="datetime1">
               <a:rPr lang="it-IT" noProof="0" smtClean="0"/>
               <a:pPr/>
-              <a:t>30/05/2019</a:t>
+              <a:t>04/06/2019</a:t>
             </a:fld>
             <a:endParaRPr lang="it-IT" noProof="0" dirty="0"/>
           </a:p>
@@ -4137,7 +4137,7 @@
   <p:clrMapOvr>
     <a:masterClrMapping/>
   </p:clrMapOvr>
-  <p:extLst mod="1">
+  <p:extLst>
     <p:ext uri="{DCECCB84-F9BA-43D5-87BE-67443E8EF086}">
       <p15:sldGuideLst xmlns:p15="http://schemas.microsoft.com/office/powerpoint/2012/main">
         <p15:guide id="1" orient="horz" pos="2160" userDrawn="1">
@@ -4570,7 +4570,7 @@
   <p:clrMapOvr>
     <a:masterClrMapping/>
   </p:clrMapOvr>
-  <p:extLst mod="1">
+  <p:extLst>
     <p:ext uri="{DCECCB84-F9BA-43D5-87BE-67443E8EF086}">
       <p15:sldGuideLst xmlns:p15="http://schemas.microsoft.com/office/powerpoint/2012/main">
         <p15:guide id="1" orient="horz" pos="2160">
@@ -5267,7 +5267,7 @@
   <p:clrMapOvr>
     <a:masterClrMapping/>
   </p:clrMapOvr>
-  <p:extLst mod="1">
+  <p:extLst>
     <p:ext uri="{DCECCB84-F9BA-43D5-87BE-67443E8EF086}">
       <p15:sldGuideLst xmlns:p15="http://schemas.microsoft.com/office/powerpoint/2012/main">
         <p15:guide id="1" orient="horz" pos="2183">
@@ -5918,7 +5918,7 @@
   <p:clrMapOvr>
     <a:masterClrMapping/>
   </p:clrMapOvr>
-  <p:extLst mod="1">
+  <p:extLst>
     <p:ext uri="{DCECCB84-F9BA-43D5-87BE-67443E8EF086}">
       <p15:sldGuideLst xmlns:p15="http://schemas.microsoft.com/office/powerpoint/2012/main">
         <p15:guide id="1" orient="horz" pos="2160">
@@ -6666,7 +6666,7 @@
   <p:clrMapOvr>
     <a:masterClrMapping/>
   </p:clrMapOvr>
-  <p:extLst mod="1">
+  <p:extLst>
     <p:ext uri="{DCECCB84-F9BA-43D5-87BE-67443E8EF086}">
       <p15:sldGuideLst xmlns:p15="http://schemas.microsoft.com/office/powerpoint/2012/main">
         <p15:guide id="1" orient="horz" pos="2160">
@@ -7538,7 +7538,7 @@
   <p:clrMapOvr>
     <a:masterClrMapping/>
   </p:clrMapOvr>
-  <p:extLst mod="1">
+  <p:extLst>
     <p:ext uri="{DCECCB84-F9BA-43D5-87BE-67443E8EF086}">
       <p15:sldGuideLst xmlns:p15="http://schemas.microsoft.com/office/powerpoint/2012/main">
         <p15:guide id="1" orient="horz" pos="2160">
@@ -8052,7 +8052,7 @@
   <p:clrMapOvr>
     <a:masterClrMapping/>
   </p:clrMapOvr>
-  <p:extLst mod="1">
+  <p:extLst>
     <p:ext uri="{DCECCB84-F9BA-43D5-87BE-67443E8EF086}">
       <p15:sldGuideLst xmlns:p15="http://schemas.microsoft.com/office/powerpoint/2012/main">
         <p15:guide id="1" orient="horz" pos="2160">
@@ -8557,7 +8557,7 @@
   <p:clrMapOvr>
     <a:masterClrMapping/>
   </p:clrMapOvr>
-  <p:extLst mod="1">
+  <p:extLst>
     <p:ext uri="{DCECCB84-F9BA-43D5-87BE-67443E8EF086}">
       <p15:sldGuideLst xmlns:p15="http://schemas.microsoft.com/office/powerpoint/2012/main">
         <p15:guide id="1" orient="horz" pos="2160">
@@ -9017,7 +9017,7 @@
   <p:clrMapOvr>
     <a:masterClrMapping/>
   </p:clrMapOvr>
-  <p:extLst mod="1">
+  <p:extLst>
     <p:ext uri="{DCECCB84-F9BA-43D5-87BE-67443E8EF086}">
       <p15:sldGuideLst xmlns:p15="http://schemas.microsoft.com/office/powerpoint/2012/main">
         <p15:guide id="1" orient="horz" pos="142">
@@ -9500,7 +9500,7 @@
   <p:clrMapOvr>
     <a:masterClrMapping/>
   </p:clrMapOvr>
-  <p:extLst mod="1">
+  <p:extLst>
     <p:ext uri="{DCECCB84-F9BA-43D5-87BE-67443E8EF086}">
       <p15:sldGuideLst xmlns:p15="http://schemas.microsoft.com/office/powerpoint/2012/main">
         <p15:guide id="1" orient="horz" pos="142">
@@ -10345,7 +10345,7 @@
   <p:clrMapOvr>
     <a:masterClrMapping/>
   </p:clrMapOvr>
-  <p:extLst mod="1">
+  <p:extLst>
     <p:ext uri="{DCECCB84-F9BA-43D5-87BE-67443E8EF086}">
       <p15:sldGuideLst xmlns:p15="http://schemas.microsoft.com/office/powerpoint/2012/main">
         <p15:guide id="1" orient="horz" pos="2183" userDrawn="1">
@@ -11045,7 +11045,7 @@
   <p:clrMapOvr>
     <a:masterClrMapping/>
   </p:clrMapOvr>
-  <p:extLst mod="1">
+  <p:extLst>
     <p:ext uri="{DCECCB84-F9BA-43D5-87BE-67443E8EF086}">
       <p15:sldGuideLst xmlns:p15="http://schemas.microsoft.com/office/powerpoint/2012/main">
         <p15:guide id="1" orient="horz" pos="142">
@@ -11666,7 +11666,7 @@
   <p:clrMapOvr>
     <a:masterClrMapping/>
   </p:clrMapOvr>
-  <p:extLst mod="1">
+  <p:extLst>
     <p:ext uri="{DCECCB84-F9BA-43D5-87BE-67443E8EF086}">
       <p15:sldGuideLst xmlns:p15="http://schemas.microsoft.com/office/powerpoint/2012/main">
         <p15:guide id="1" orient="horz" pos="142">
@@ -12627,7 +12627,7 @@
   <p:clrMapOvr>
     <a:masterClrMapping/>
   </p:clrMapOvr>
-  <p:extLst mod="1">
+  <p:extLst>
     <p:ext uri="{DCECCB84-F9BA-43D5-87BE-67443E8EF086}">
       <p15:sldGuideLst xmlns:p15="http://schemas.microsoft.com/office/powerpoint/2012/main">
         <p15:guide id="1" orient="horz" pos="2160">
@@ -13303,7 +13303,7 @@
   <p:clrMapOvr>
     <a:masterClrMapping/>
   </p:clrMapOvr>
-  <p:extLst mod="1">
+  <p:extLst>
     <p:ext uri="{DCECCB84-F9BA-43D5-87BE-67443E8EF086}">
       <p15:sldGuideLst xmlns:p15="http://schemas.microsoft.com/office/powerpoint/2012/main">
         <p15:guide id="1" orient="horz" pos="142">
@@ -13890,7 +13890,7 @@
   <p:clrMapOvr>
     <a:masterClrMapping/>
   </p:clrMapOvr>
-  <p:extLst mod="1">
+  <p:extLst>
     <p:ext uri="{DCECCB84-F9BA-43D5-87BE-67443E8EF086}">
       <p15:sldGuideLst xmlns:p15="http://schemas.microsoft.com/office/powerpoint/2012/main">
         <p15:guide id="1" orient="horz" pos="142">
@@ -14192,7 +14192,7 @@
   <p:clrMapOvr>
     <a:masterClrMapping/>
   </p:clrMapOvr>
-  <p:extLst mod="1">
+  <p:extLst>
     <p:ext uri="{DCECCB84-F9BA-43D5-87BE-67443E8EF086}">
       <p15:sldGuideLst xmlns:p15="http://schemas.microsoft.com/office/powerpoint/2012/main">
         <p15:guide id="1" orient="horz" pos="2160" userDrawn="1">
@@ -16138,7 +16138,7 @@
   <p:clrMapOvr>
     <a:masterClrMapping/>
   </p:clrMapOvr>
-  <p:extLst mod="1">
+  <p:extLst>
     <p:ext uri="{DCECCB84-F9BA-43D5-87BE-67443E8EF086}">
       <p15:sldGuideLst xmlns:p15="http://schemas.microsoft.com/office/powerpoint/2012/main">
         <p15:guide id="1" orient="horz" pos="2160">
@@ -22642,7 +22642,7 @@
       </p:sp>
       <p:pic>
         <p:nvPicPr>
-          <p:cNvPr id="6" name="Segnaposto contenuto 5" descr="Immagine che contiene testo, mappa&#10;&#10;Descrizione generata automaticamente">
+          <p:cNvPr id="6" name="Segnaposto contenuto 5">
             <a:extLst>
               <a:ext uri="{FF2B5EF4-FFF2-40B4-BE49-F238E27FC236}">
                 <a16:creationId xmlns:a16="http://schemas.microsoft.com/office/drawing/2014/main" id="{9F864FC5-0AF8-48D5-9652-BD30A4FC5C63}"/>
@@ -22658,14 +22658,13 @@
         </p:nvPicPr>
         <p:blipFill>
           <a:blip r:embed="rId3"/>
-          <a:stretch>
-            <a:fillRect/>
-          </a:stretch>
+          <a:srcRect/>
+          <a:stretch/>
         </p:blipFill>
         <p:spPr>
           <a:xfrm>
-            <a:off x="2075970" y="3278670"/>
-            <a:ext cx="5798030" cy="2338221"/>
+            <a:off x="1228683" y="2859499"/>
+            <a:ext cx="8477379" cy="3418747"/>
           </a:xfrm>
         </p:spPr>
       </p:pic>

</xml_diff>

<commit_message>
Frase aggiustata nella presentazione
</commit_message>
<xml_diff>
--- a/Progetto Ingegneria SW.pptx
+++ b/Progetto Ingegneria SW.pptx
@@ -21756,34 +21756,22 @@
             </a:r>
             <a:r>
               <a:rPr lang="it-IT" dirty="0"/>
-              <a:t> – Field). Per proteggere la Categoria dal cambiamento dei valori del Campo, e da quello che ne consegue, abbiamo fatto in modo che oggetti che utilizzano la Categoria non parlino con i Campi. (</a:t>
-            </a:r>
-            <a:r>
-              <a:rPr lang="it-IT" dirty="0">
-                <a:solidFill>
-                  <a:srgbClr val="FF0000"/>
-                </a:solidFill>
-              </a:rPr>
-              <a:t>AGGIUSTARE FRASE</a:t>
+              <a:t> – Field). Per proteggere la Categoria dal cambiamento dei valori del Campo, e da quello che ne consegue, gli oggetti che utilizzano la Categoria non parlano più direttamente con i </a:t>
+            </a:r>
+            <a:r>
+              <a:rPr lang="it-IT"/>
+              <a:t>Campi.</a:t>
+            </a:r>
+          </a:p>
+          <a:p>
+            <a:pPr lvl="0" rtl="0"/>
+            <a:r>
+              <a:rPr lang="it-IT"/>
+              <a:t>Seguendo </a:t>
             </a:r>
             <a:r>
               <a:rPr lang="it-IT" dirty="0"/>
-              <a:t>)</a:t>
-            </a:r>
-          </a:p>
-          <a:p>
-            <a:pPr lvl="0" rtl="0"/>
-            <a:r>
-              <a:rPr lang="it-IT" dirty="0"/>
-              <a:t>Seguendo la Legge di Demetra abbiamo fatto in modo </a:t>
-            </a:r>
-            <a:r>
-              <a:rPr lang="it-IT" dirty="0" err="1"/>
-              <a:t>checiascuna</a:t>
-            </a:r>
-            <a:r>
-              <a:rPr lang="it-IT" dirty="0"/>
-              <a:t> classe parlasse solo con classi con cui si ha diretta dipendenza, evitando di parlare con «stranieri», cioè oggetti indiretti.</a:t>
+              <a:t>la Legge di Demetra abbiamo fatto in modo che ciascuna classe parlasse solo con classi con cui si ha diretta dipendenza, evitando di parlare con «stranieri», cioè oggetti indiretti.</a:t>
             </a:r>
           </a:p>
         </p:txBody>

</xml_diff>

<commit_message>
Presentazione aggiornata con Strategy
</commit_message>
<xml_diff>
--- a/Progetto Ingegneria SW.pptx
+++ b/Progetto Ingegneria SW.pptx
@@ -5,10 +5,10 @@
     <p:sldMasterId id="2147483756" r:id="rId1"/>
   </p:sldMasterIdLst>
   <p:notesMasterIdLst>
-    <p:notesMasterId r:id="rId22"/>
+    <p:notesMasterId r:id="rId24"/>
   </p:notesMasterIdLst>
   <p:handoutMasterIdLst>
-    <p:handoutMasterId r:id="rId23"/>
+    <p:handoutMasterId r:id="rId25"/>
   </p:handoutMasterIdLst>
   <p:sldIdLst>
     <p:sldId id="256" r:id="rId2"/>
@@ -31,6 +31,8 @@
     <p:sldId id="283" r:id="rId19"/>
     <p:sldId id="289" r:id="rId20"/>
     <p:sldId id="288" r:id="rId21"/>
+    <p:sldId id="290" r:id="rId22"/>
+    <p:sldId id="291" r:id="rId23"/>
   </p:sldIdLst>
   <p:sldSz cx="12192000" cy="6858000"/>
   <p:notesSz cx="6858000" cy="9144000"/>
@@ -252,7 +254,7 @@
             <a:pPr rtl="0"/>
             <a:fld id="{BEFBFAFD-B367-4FDC-8BD6-0ED3AC1E8171}" type="datetime1">
               <a:rPr lang="it-IT" smtClean="0"/>
-              <a:t>19/06/2019</a:t>
+              <a:t>20/06/2019</a:t>
             </a:fld>
             <a:endParaRPr lang="it-IT" dirty="0"/>
           </a:p>
@@ -434,7 +436,7 @@
             <a:fld id="{358ABC55-7EA4-4B04-948D-8B6AA303BF20}" type="datetime1">
               <a:rPr lang="it-IT" noProof="0" smtClean="0"/>
               <a:pPr/>
-              <a:t>19/06/2019</a:t>
+              <a:t>20/06/2019</a:t>
             </a:fld>
             <a:endParaRPr lang="it-IT" noProof="0" dirty="0"/>
           </a:p>
@@ -1823,6 +1825,178 @@
 </p:notes>
 </file>
 
+<file path=ppt/notesSlides/notesSlide21.xml><?xml version="1.0" encoding="utf-8"?>
+<p:notes xmlns:a="http://schemas.openxmlformats.org/drawingml/2006/main" xmlns:r="http://schemas.openxmlformats.org/officeDocument/2006/relationships" xmlns:p="http://schemas.openxmlformats.org/presentationml/2006/main">
+  <p:cSld>
+    <p:spTree>
+      <p:nvGrpSpPr>
+        <p:cNvPr id="1" name=""/>
+        <p:cNvGrpSpPr/>
+        <p:nvPr/>
+      </p:nvGrpSpPr>
+      <p:grpSpPr>
+        <a:xfrm>
+          <a:off x="0" y="0"/>
+          <a:ext cx="0" cy="0"/>
+          <a:chOff x="0" y="0"/>
+          <a:chExt cx="0" cy="0"/>
+        </a:xfrm>
+      </p:grpSpPr>
+      <p:sp>
+        <p:nvSpPr>
+          <p:cNvPr id="2" name="Segnaposto immagine diapositiva 1"/>
+          <p:cNvSpPr>
+            <a:spLocks noGrp="1" noRot="1" noChangeAspect="1"/>
+          </p:cNvSpPr>
+          <p:nvPr>
+            <p:ph type="sldImg"/>
+          </p:nvPr>
+        </p:nvSpPr>
+        <p:spPr/>
+      </p:sp>
+      <p:sp>
+        <p:nvSpPr>
+          <p:cNvPr id="3" name="Segnaposto note 2"/>
+          <p:cNvSpPr>
+            <a:spLocks noGrp="1"/>
+          </p:cNvSpPr>
+          <p:nvPr>
+            <p:ph type="body" idx="1"/>
+          </p:nvPr>
+        </p:nvSpPr>
+        <p:spPr/>
+        <p:txBody>
+          <a:bodyPr rtlCol="0"/>
+          <a:lstStyle/>
+          <a:p>
+            <a:pPr rtl="0"/>
+            <a:endParaRPr lang="it-IT" dirty="0"/>
+          </a:p>
+        </p:txBody>
+      </p:sp>
+      <p:sp>
+        <p:nvSpPr>
+          <p:cNvPr id="4" name="Segnaposto numero diapositiva 3"/>
+          <p:cNvSpPr>
+            <a:spLocks noGrp="1"/>
+          </p:cNvSpPr>
+          <p:nvPr>
+            <p:ph type="sldNum" sz="quarter" idx="5"/>
+          </p:nvPr>
+        </p:nvSpPr>
+        <p:spPr/>
+        <p:txBody>
+          <a:bodyPr rtlCol="0"/>
+          <a:lstStyle/>
+          <a:p>
+            <a:pPr rtl="0"/>
+            <a:fld id="{79230CFA-805A-4FD3-B3A0-DAAA5993DA17}" type="slidenum">
+              <a:rPr lang="it-IT" smtClean="0"/>
+              <a:t>21</a:t>
+            </a:fld>
+            <a:endParaRPr lang="it-IT" dirty="0"/>
+          </a:p>
+        </p:txBody>
+      </p:sp>
+    </p:spTree>
+    <p:extLst>
+      <p:ext uri="{BB962C8B-B14F-4D97-AF65-F5344CB8AC3E}">
+        <p14:creationId xmlns:p14="http://schemas.microsoft.com/office/powerpoint/2010/main" val="3774857302"/>
+      </p:ext>
+    </p:extLst>
+  </p:cSld>
+  <p:clrMapOvr>
+    <a:masterClrMapping/>
+  </p:clrMapOvr>
+</p:notes>
+</file>
+
+<file path=ppt/notesSlides/notesSlide22.xml><?xml version="1.0" encoding="utf-8"?>
+<p:notes xmlns:a="http://schemas.openxmlformats.org/drawingml/2006/main" xmlns:r="http://schemas.openxmlformats.org/officeDocument/2006/relationships" xmlns:p="http://schemas.openxmlformats.org/presentationml/2006/main">
+  <p:cSld>
+    <p:spTree>
+      <p:nvGrpSpPr>
+        <p:cNvPr id="1" name=""/>
+        <p:cNvGrpSpPr/>
+        <p:nvPr/>
+      </p:nvGrpSpPr>
+      <p:grpSpPr>
+        <a:xfrm>
+          <a:off x="0" y="0"/>
+          <a:ext cx="0" cy="0"/>
+          <a:chOff x="0" y="0"/>
+          <a:chExt cx="0" cy="0"/>
+        </a:xfrm>
+      </p:grpSpPr>
+      <p:sp>
+        <p:nvSpPr>
+          <p:cNvPr id="2" name="Segnaposto immagine diapositiva 1"/>
+          <p:cNvSpPr>
+            <a:spLocks noGrp="1" noRot="1" noChangeAspect="1"/>
+          </p:cNvSpPr>
+          <p:nvPr>
+            <p:ph type="sldImg"/>
+          </p:nvPr>
+        </p:nvSpPr>
+        <p:spPr/>
+      </p:sp>
+      <p:sp>
+        <p:nvSpPr>
+          <p:cNvPr id="3" name="Segnaposto note 2"/>
+          <p:cNvSpPr>
+            <a:spLocks noGrp="1"/>
+          </p:cNvSpPr>
+          <p:nvPr>
+            <p:ph type="body" idx="1"/>
+          </p:nvPr>
+        </p:nvSpPr>
+        <p:spPr/>
+        <p:txBody>
+          <a:bodyPr rtlCol="0"/>
+          <a:lstStyle/>
+          <a:p>
+            <a:pPr rtl="0"/>
+            <a:endParaRPr lang="it-IT" dirty="0"/>
+          </a:p>
+        </p:txBody>
+      </p:sp>
+      <p:sp>
+        <p:nvSpPr>
+          <p:cNvPr id="4" name="Segnaposto numero diapositiva 3"/>
+          <p:cNvSpPr>
+            <a:spLocks noGrp="1"/>
+          </p:cNvSpPr>
+          <p:nvPr>
+            <p:ph type="sldNum" sz="quarter" idx="5"/>
+          </p:nvPr>
+        </p:nvSpPr>
+        <p:spPr/>
+        <p:txBody>
+          <a:bodyPr rtlCol="0"/>
+          <a:lstStyle/>
+          <a:p>
+            <a:pPr rtl="0"/>
+            <a:fld id="{79230CFA-805A-4FD3-B3A0-DAAA5993DA17}" type="slidenum">
+              <a:rPr lang="it-IT" smtClean="0"/>
+              <a:t>22</a:t>
+            </a:fld>
+            <a:endParaRPr lang="it-IT" dirty="0"/>
+          </a:p>
+        </p:txBody>
+      </p:sp>
+    </p:spTree>
+    <p:extLst>
+      <p:ext uri="{BB962C8B-B14F-4D97-AF65-F5344CB8AC3E}">
+        <p14:creationId xmlns:p14="http://schemas.microsoft.com/office/powerpoint/2010/main" val="2870494128"/>
+      </p:ext>
+    </p:extLst>
+  </p:cSld>
+  <p:clrMapOvr>
+    <a:masterClrMapping/>
+  </p:clrMapOvr>
+</p:notes>
+</file>
+
 <file path=ppt/notesSlides/notesSlide3.xml><?xml version="1.0" encoding="utf-8"?>
 <p:notes xmlns:a="http://schemas.openxmlformats.org/drawingml/2006/main" xmlns:r="http://schemas.openxmlformats.org/officeDocument/2006/relationships" xmlns:p="http://schemas.openxmlformats.org/presentationml/2006/main">
   <p:cSld>
@@ -2572,7 +2746,7 @@
           <a:p>
             <a:fld id="{D2C95273-7EA1-449B-9AF4-4A92A4F80372}" type="datetimeFigureOut">
               <a:rPr lang="it-IT" smtClean="0"/>
-              <a:t>19/06/2019</a:t>
+              <a:t>20/06/2019</a:t>
             </a:fld>
             <a:endParaRPr lang="it-IT"/>
           </a:p>
@@ -3010,7 +3184,7 @@
           <a:p>
             <a:fld id="{D2C95273-7EA1-449B-9AF4-4A92A4F80372}" type="datetimeFigureOut">
               <a:rPr lang="it-IT" smtClean="0"/>
-              <a:t>19/06/2019</a:t>
+              <a:t>20/06/2019</a:t>
             </a:fld>
             <a:endParaRPr lang="it-IT"/>
           </a:p>
@@ -3226,7 +3400,7 @@
           <a:p>
             <a:fld id="{D2C95273-7EA1-449B-9AF4-4A92A4F80372}" type="datetimeFigureOut">
               <a:rPr lang="it-IT" smtClean="0"/>
-              <a:t>19/06/2019</a:t>
+              <a:t>20/06/2019</a:t>
             </a:fld>
             <a:endParaRPr lang="it-IT"/>
           </a:p>
@@ -8497,7 +8671,7 @@
           <a:p>
             <a:fld id="{D2C95273-7EA1-449B-9AF4-4A92A4F80372}" type="datetimeFigureOut">
               <a:rPr lang="it-IT" smtClean="0"/>
-              <a:t>19/06/2019</a:t>
+              <a:t>20/06/2019</a:t>
             </a:fld>
             <a:endParaRPr lang="it-IT"/>
           </a:p>
@@ -12788,7 +12962,7 @@
           <a:p>
             <a:fld id="{D2C95273-7EA1-449B-9AF4-4A92A4F80372}" type="datetimeFigureOut">
               <a:rPr lang="it-IT" smtClean="0"/>
-              <a:t>19/06/2019</a:t>
+              <a:t>20/06/2019</a:t>
             </a:fld>
             <a:endParaRPr lang="it-IT"/>
           </a:p>
@@ -13505,7 +13679,7 @@
           <a:p>
             <a:fld id="{D2C95273-7EA1-449B-9AF4-4A92A4F80372}" type="datetimeFigureOut">
               <a:rPr lang="it-IT" smtClean="0"/>
-              <a:t>19/06/2019</a:t>
+              <a:t>20/06/2019</a:t>
             </a:fld>
             <a:endParaRPr lang="it-IT"/>
           </a:p>
@@ -14301,7 +14475,7 @@
           <a:p>
             <a:fld id="{D2C95273-7EA1-449B-9AF4-4A92A4F80372}" type="datetimeFigureOut">
               <a:rPr lang="it-IT" smtClean="0"/>
-              <a:t>19/06/2019</a:t>
+              <a:t>20/06/2019</a:t>
             </a:fld>
             <a:endParaRPr lang="it-IT"/>
           </a:p>
@@ -14826,7 +15000,7 @@
           <a:p>
             <a:fld id="{D2C95273-7EA1-449B-9AF4-4A92A4F80372}" type="datetimeFigureOut">
               <a:rPr lang="it-IT" smtClean="0"/>
-              <a:t>19/06/2019</a:t>
+              <a:t>20/06/2019</a:t>
             </a:fld>
             <a:endParaRPr lang="it-IT"/>
           </a:p>
@@ -15280,7 +15454,7 @@
           <a:p>
             <a:fld id="{D2C95273-7EA1-449B-9AF4-4A92A4F80372}" type="datetimeFigureOut">
               <a:rPr lang="it-IT" smtClean="0"/>
-              <a:t>19/06/2019</a:t>
+              <a:t>20/06/2019</a:t>
             </a:fld>
             <a:endParaRPr lang="it-IT"/>
           </a:p>
@@ -15599,7 +15773,7 @@
           <a:p>
             <a:fld id="{D2C95273-7EA1-449B-9AF4-4A92A4F80372}" type="datetimeFigureOut">
               <a:rPr lang="it-IT" smtClean="0"/>
-              <a:t>19/06/2019</a:t>
+              <a:t>20/06/2019</a:t>
             </a:fld>
             <a:endParaRPr lang="it-IT"/>
           </a:p>
@@ -16127,7 +16301,7 @@
           <a:p>
             <a:fld id="{D2C95273-7EA1-449B-9AF4-4A92A4F80372}" type="datetimeFigureOut">
               <a:rPr lang="it-IT" smtClean="0"/>
-              <a:t>19/06/2019</a:t>
+              <a:t>20/06/2019</a:t>
             </a:fld>
             <a:endParaRPr lang="it-IT"/>
           </a:p>
@@ -16608,7 +16782,7 @@
           <a:p>
             <a:fld id="{D2C95273-7EA1-449B-9AF4-4A92A4F80372}" type="datetimeFigureOut">
               <a:rPr lang="it-IT" smtClean="0"/>
-              <a:t>19/06/2019</a:t>
+              <a:t>20/06/2019</a:t>
             </a:fld>
             <a:endParaRPr lang="it-IT"/>
           </a:p>
@@ -20052,7 +20226,7 @@
                   <a:schemeClr val="tx1"/>
                 </a:solidFill>
               </a:rPr>
-              <a:t>Il numero delle classi aumenta (una per ogni stato)</a:t>
+              <a:t>Il numero delle classi è aumentata (una per ogni stato)</a:t>
             </a:r>
           </a:p>
         </p:txBody>
@@ -20229,6 +20403,726 @@
     <p:extLst>
       <p:ext uri="{BB962C8B-B14F-4D97-AF65-F5344CB8AC3E}">
         <p14:creationId xmlns:p14="http://schemas.microsoft.com/office/powerpoint/2010/main" val="3031756133"/>
+      </p:ext>
+    </p:extLst>
+  </p:cSld>
+  <p:clrMapOvr>
+    <a:overrideClrMapping bg1="lt1" tx1="dk1" bg2="lt2" tx2="dk2" accent1="accent1" accent2="accent2" accent3="accent3" accent4="accent4" accent5="accent5" accent6="accent6" hlink="hlink" folHlink="folHlink"/>
+  </p:clrMapOvr>
+</p:sld>
+</file>
+
+<file path=ppt/slides/slide21.xml><?xml version="1.0" encoding="utf-8"?>
+<p:sld xmlns:a="http://schemas.openxmlformats.org/drawingml/2006/main" xmlns:r="http://schemas.openxmlformats.org/officeDocument/2006/relationships" xmlns:p="http://schemas.openxmlformats.org/presentationml/2006/main" showMasterSp="0">
+  <p:cSld>
+    <p:spTree>
+      <p:nvGrpSpPr>
+        <p:cNvPr id="1" name=""/>
+        <p:cNvGrpSpPr/>
+        <p:nvPr/>
+      </p:nvGrpSpPr>
+      <p:grpSpPr>
+        <a:xfrm>
+          <a:off x="0" y="0"/>
+          <a:ext cx="0" cy="0"/>
+          <a:chOff x="0" y="0"/>
+          <a:chExt cx="0" cy="0"/>
+        </a:xfrm>
+      </p:grpSpPr>
+      <p:sp>
+        <p:nvSpPr>
+          <p:cNvPr id="7" name="Segnaposto contenuto 6">
+            <a:extLst>
+              <a:ext uri="{FF2B5EF4-FFF2-40B4-BE49-F238E27FC236}">
+                <a16:creationId xmlns:a16="http://schemas.microsoft.com/office/drawing/2014/main" id="{2482DBEC-EE72-4155-ACC5-87E80C5606A9}"/>
+              </a:ext>
+            </a:extLst>
+          </p:cNvPr>
+          <p:cNvSpPr>
+            <a:spLocks noGrp="1"/>
+          </p:cNvSpPr>
+          <p:nvPr>
+            <p:ph idx="1"/>
+          </p:nvPr>
+        </p:nvSpPr>
+        <p:spPr>
+          <a:xfrm>
+            <a:off x="531378" y="3129540"/>
+            <a:ext cx="10307198" cy="2958275"/>
+          </a:xfrm>
+        </p:spPr>
+        <p:txBody>
+          <a:bodyPr rtlCol="0">
+            <a:normAutofit/>
+          </a:bodyPr>
+          <a:lstStyle/>
+          <a:p>
+            <a:r>
+              <a:rPr lang="it-IT" dirty="0"/>
+              <a:t>Avevamo diversi comandi disponibili all’utente, comandi però </a:t>
+            </a:r>
+            <a:r>
+              <a:rPr lang="it-IT" dirty="0">
+                <a:solidFill>
+                  <a:srgbClr val="FF0000"/>
+                </a:solidFill>
+              </a:rPr>
+              <a:t>statici</a:t>
+            </a:r>
+            <a:r>
+              <a:rPr lang="it-IT" dirty="0"/>
+              <a:t> e tutti raggruppati in un </a:t>
+            </a:r>
+            <a:r>
+              <a:rPr lang="it-IT" dirty="0" err="1"/>
+              <a:t>Enum</a:t>
+            </a:r>
+            <a:endParaRPr lang="it-IT" dirty="0">
+              <a:solidFill>
+                <a:srgbClr val="FF0000"/>
+              </a:solidFill>
+            </a:endParaRPr>
+          </a:p>
+          <a:p>
+            <a:r>
+              <a:rPr lang="it-IT" dirty="0"/>
+              <a:t>La </a:t>
+            </a:r>
+            <a:r>
+              <a:rPr lang="it-IT" dirty="0">
+                <a:solidFill>
+                  <a:schemeClr val="accent6"/>
+                </a:solidFill>
+              </a:rPr>
+              <a:t>soluzione</a:t>
+            </a:r>
+            <a:r>
+              <a:rPr lang="it-IT" dirty="0"/>
+              <a:t> è creare una classe per ogni comando, ognuna delle quali estende la classe madre comune</a:t>
+            </a:r>
+          </a:p>
+          <a:p>
+            <a:r>
+              <a:rPr lang="it-IT" dirty="0"/>
+              <a:t>Permette di scegliere il comando a </a:t>
+            </a:r>
+            <a:r>
+              <a:rPr lang="it-IT" dirty="0" err="1"/>
+              <a:t>Run</a:t>
+            </a:r>
+            <a:r>
+              <a:rPr lang="it-IT" dirty="0"/>
+              <a:t>-Time e non più Compile-Time</a:t>
+            </a:r>
+          </a:p>
+          <a:p>
+            <a:endParaRPr lang="it-IT" i="1" dirty="0"/>
+          </a:p>
+          <a:p>
+            <a:endParaRPr lang="it-IT" i="1" dirty="0"/>
+          </a:p>
+        </p:txBody>
+      </p:sp>
+      <p:sp>
+        <p:nvSpPr>
+          <p:cNvPr id="9" name="Segnaposto testo 8">
+            <a:extLst>
+              <a:ext uri="{FF2B5EF4-FFF2-40B4-BE49-F238E27FC236}">
+                <a16:creationId xmlns:a16="http://schemas.microsoft.com/office/drawing/2014/main" id="{53469036-D1FB-4164-96AE-B6D8CECCFC96}"/>
+              </a:ext>
+            </a:extLst>
+          </p:cNvPr>
+          <p:cNvSpPr>
+            <a:spLocks noGrp="1"/>
+          </p:cNvSpPr>
+          <p:nvPr>
+            <p:ph type="body" sz="quarter" idx="13"/>
+          </p:nvPr>
+        </p:nvSpPr>
+        <p:spPr/>
+        <p:txBody>
+          <a:bodyPr rtlCol="0"/>
+          <a:lstStyle/>
+          <a:p>
+            <a:pPr rtl="0"/>
+            <a:r>
+              <a:rPr lang="it-IT" dirty="0"/>
+              <a:t>Pattern </a:t>
+            </a:r>
+            <a:r>
+              <a:rPr lang="it-IT" dirty="0" err="1"/>
+              <a:t>GoF</a:t>
+            </a:r>
+            <a:endParaRPr lang="it-IT" dirty="0"/>
+          </a:p>
+        </p:txBody>
+      </p:sp>
+      <p:sp>
+        <p:nvSpPr>
+          <p:cNvPr id="4" name="Titolo 3">
+            <a:extLst>
+              <a:ext uri="{FF2B5EF4-FFF2-40B4-BE49-F238E27FC236}">
+                <a16:creationId xmlns:a16="http://schemas.microsoft.com/office/drawing/2014/main" id="{1ABE11BF-33A5-4653-A144-CCCBACF58C30}"/>
+              </a:ext>
+            </a:extLst>
+          </p:cNvPr>
+          <p:cNvSpPr>
+            <a:spLocks noGrp="1"/>
+          </p:cNvSpPr>
+          <p:nvPr>
+            <p:ph type="title"/>
+          </p:nvPr>
+        </p:nvSpPr>
+        <p:spPr/>
+        <p:txBody>
+          <a:bodyPr rtlCol="0">
+            <a:normAutofit/>
+          </a:bodyPr>
+          <a:lstStyle/>
+          <a:p>
+            <a:r>
+              <a:rPr lang="it-IT" dirty="0"/>
+              <a:t>Strategy</a:t>
+            </a:r>
+          </a:p>
+        </p:txBody>
+      </p:sp>
+      <p:sp>
+        <p:nvSpPr>
+          <p:cNvPr id="11" name="Segnaposto piè di pagina 10">
+            <a:extLst>
+              <a:ext uri="{FF2B5EF4-FFF2-40B4-BE49-F238E27FC236}">
+                <a16:creationId xmlns:a16="http://schemas.microsoft.com/office/drawing/2014/main" id="{47F4D2C2-B71A-4089-A3FE-603C32706CA6}"/>
+              </a:ext>
+            </a:extLst>
+          </p:cNvPr>
+          <p:cNvSpPr>
+            <a:spLocks noGrp="1"/>
+          </p:cNvSpPr>
+          <p:nvPr>
+            <p:ph type="ftr" sz="quarter" idx="14"/>
+          </p:nvPr>
+        </p:nvSpPr>
+        <p:spPr/>
+        <p:txBody>
+          <a:bodyPr rtlCol="0"/>
+          <a:lstStyle/>
+          <a:p>
+            <a:pPr rtl="0"/>
+            <a:r>
+              <a:rPr lang="it-IT" dirty="0"/>
+              <a:t>Aggiungere un piè di pagina</a:t>
+            </a:r>
+          </a:p>
+        </p:txBody>
+      </p:sp>
+      <p:sp>
+        <p:nvSpPr>
+          <p:cNvPr id="12" name="Segnaposto numero diapositiva 11">
+            <a:extLst>
+              <a:ext uri="{FF2B5EF4-FFF2-40B4-BE49-F238E27FC236}">
+                <a16:creationId xmlns:a16="http://schemas.microsoft.com/office/drawing/2014/main" id="{FBA1BB58-7555-4382-B178-7ED04E137E77}"/>
+              </a:ext>
+            </a:extLst>
+          </p:cNvPr>
+          <p:cNvSpPr>
+            <a:spLocks noGrp="1"/>
+          </p:cNvSpPr>
+          <p:nvPr>
+            <p:ph type="sldNum" sz="quarter" idx="15"/>
+          </p:nvPr>
+        </p:nvSpPr>
+        <p:spPr/>
+        <p:txBody>
+          <a:bodyPr rtlCol="0"/>
+          <a:lstStyle/>
+          <a:p>
+            <a:pPr rtl="0"/>
+            <a:fld id="{8699F50C-BE38-4BD0-BA84-9B090E1F2B9B}" type="slidenum">
+              <a:rPr lang="it-IT" smtClean="0"/>
+              <a:pPr rtl="0"/>
+              <a:t>21</a:t>
+            </a:fld>
+            <a:endParaRPr lang="it-IT" dirty="0"/>
+          </a:p>
+        </p:txBody>
+      </p:sp>
+    </p:spTree>
+    <p:extLst>
+      <p:ext uri="{BB962C8B-B14F-4D97-AF65-F5344CB8AC3E}">
+        <p14:creationId xmlns:p14="http://schemas.microsoft.com/office/powerpoint/2010/main" val="3928363960"/>
+      </p:ext>
+    </p:extLst>
+  </p:cSld>
+  <p:clrMapOvr>
+    <a:masterClrMapping/>
+  </p:clrMapOvr>
+</p:sld>
+</file>
+
+<file path=ppt/slides/slide22.xml><?xml version="1.0" encoding="utf-8"?>
+<p:sld xmlns:a="http://schemas.openxmlformats.org/drawingml/2006/main" xmlns:r="http://schemas.openxmlformats.org/officeDocument/2006/relationships" xmlns:p="http://schemas.openxmlformats.org/presentationml/2006/main" showMasterSp="0">
+  <p:cSld>
+    <p:bg>
+      <p:bgRef idx="1001">
+        <a:schemeClr val="bg1"/>
+      </p:bgRef>
+    </p:bg>
+    <p:spTree>
+      <p:nvGrpSpPr>
+        <p:cNvPr id="1" name=""/>
+        <p:cNvGrpSpPr/>
+        <p:nvPr/>
+      </p:nvGrpSpPr>
+      <p:grpSpPr>
+        <a:xfrm>
+          <a:off x="0" y="0"/>
+          <a:ext cx="0" cy="0"/>
+          <a:chOff x="0" y="0"/>
+          <a:chExt cx="0" cy="0"/>
+        </a:xfrm>
+      </p:grpSpPr>
+      <p:sp>
+        <p:nvSpPr>
+          <p:cNvPr id="15" name="Segnaposto testo 14">
+            <a:extLst>
+              <a:ext uri="{FF2B5EF4-FFF2-40B4-BE49-F238E27FC236}">
+                <a16:creationId xmlns:a16="http://schemas.microsoft.com/office/drawing/2014/main" id="{24E18385-8BEA-4522-ABAA-5AB38F0D4FC2}"/>
+              </a:ext>
+            </a:extLst>
+          </p:cNvPr>
+          <p:cNvSpPr>
+            <a:spLocks noGrp="1"/>
+          </p:cNvSpPr>
+          <p:nvPr>
+            <p:ph type="body" idx="1"/>
+          </p:nvPr>
+        </p:nvSpPr>
+        <p:spPr>
+          <a:xfrm>
+            <a:off x="518678" y="1714294"/>
+            <a:ext cx="5475290" cy="781188"/>
+          </a:xfrm>
+        </p:spPr>
+        <p:txBody>
+          <a:bodyPr rtlCol="0"/>
+          <a:lstStyle/>
+          <a:p>
+            <a:pPr rtl="0"/>
+            <a:r>
+              <a:rPr lang="it-IT" dirty="0"/>
+              <a:t>Vantaggi</a:t>
+            </a:r>
+          </a:p>
+        </p:txBody>
+      </p:sp>
+      <p:sp>
+        <p:nvSpPr>
+          <p:cNvPr id="16" name="Segnaposto contenuto 15">
+            <a:extLst>
+              <a:ext uri="{FF2B5EF4-FFF2-40B4-BE49-F238E27FC236}">
+                <a16:creationId xmlns:a16="http://schemas.microsoft.com/office/drawing/2014/main" id="{1DCFA8A2-3FB8-48CA-933D-0800A9D2A2A2}"/>
+              </a:ext>
+            </a:extLst>
+          </p:cNvPr>
+          <p:cNvSpPr>
+            <a:spLocks noGrp="1"/>
+          </p:cNvSpPr>
+          <p:nvPr>
+            <p:ph sz="half" idx="13"/>
+          </p:nvPr>
+        </p:nvSpPr>
+        <p:spPr>
+          <a:xfrm>
+            <a:off x="569694" y="2462567"/>
+            <a:ext cx="5475290" cy="3232149"/>
+          </a:xfrm>
+        </p:spPr>
+        <p:txBody>
+          <a:bodyPr rtlCol="0">
+            <a:normAutofit/>
+          </a:bodyPr>
+          <a:lstStyle/>
+          <a:p>
+            <a:pPr rtl="0">
+              <a:buClr>
+                <a:schemeClr val="accent2"/>
+              </a:buClr>
+            </a:pPr>
+            <a:r>
+              <a:rPr lang="it-IT" sz="2000" dirty="0">
+                <a:solidFill>
+                  <a:schemeClr val="tx1"/>
+                </a:solidFill>
+              </a:rPr>
+              <a:t>Porta a fattore comune funzionalità comuni a più comandi</a:t>
+            </a:r>
+          </a:p>
+          <a:p>
+            <a:pPr rtl="0">
+              <a:buClr>
+                <a:schemeClr val="accent2"/>
+              </a:buClr>
+            </a:pPr>
+            <a:r>
+              <a:rPr lang="it-IT" sz="2000" dirty="0">
+                <a:solidFill>
+                  <a:schemeClr val="tx1"/>
+                </a:solidFill>
+              </a:rPr>
+              <a:t>Pattern </a:t>
+            </a:r>
+            <a:r>
+              <a:rPr lang="it-IT" sz="2000" dirty="0" err="1">
+                <a:solidFill>
+                  <a:schemeClr val="tx1"/>
+                </a:solidFill>
+              </a:rPr>
+              <a:t>Context</a:t>
+            </a:r>
+            <a:r>
+              <a:rPr lang="it-IT" sz="2000" dirty="0">
+                <a:solidFill>
+                  <a:schemeClr val="tx1"/>
+                </a:solidFill>
+              </a:rPr>
+              <a:t> semplice da capire e manutenere</a:t>
+            </a:r>
+          </a:p>
+          <a:p>
+            <a:pPr rtl="0">
+              <a:buClr>
+                <a:schemeClr val="accent2"/>
+              </a:buClr>
+            </a:pPr>
+            <a:r>
+              <a:rPr lang="it-IT" sz="2000" dirty="0">
+                <a:solidFill>
+                  <a:schemeClr val="tx1"/>
+                </a:solidFill>
+              </a:rPr>
+              <a:t>Permette di modificare l’algoritmo dinamicamente</a:t>
+            </a:r>
+          </a:p>
+        </p:txBody>
+      </p:sp>
+      <p:sp>
+        <p:nvSpPr>
+          <p:cNvPr id="17" name="Segnaposto testo 16">
+            <a:extLst>
+              <a:ext uri="{FF2B5EF4-FFF2-40B4-BE49-F238E27FC236}">
+                <a16:creationId xmlns:a16="http://schemas.microsoft.com/office/drawing/2014/main" id="{640A3223-3DA3-4CF2-82B6-1447667547BD}"/>
+              </a:ext>
+            </a:extLst>
+          </p:cNvPr>
+          <p:cNvSpPr>
+            <a:spLocks noGrp="1"/>
+          </p:cNvSpPr>
+          <p:nvPr>
+            <p:ph type="body" sz="quarter" idx="14"/>
+          </p:nvPr>
+        </p:nvSpPr>
+        <p:spPr>
+          <a:xfrm>
+            <a:off x="6096000" y="1681379"/>
+            <a:ext cx="5475600" cy="781188"/>
+          </a:xfrm>
+        </p:spPr>
+        <p:txBody>
+          <a:bodyPr rtlCol="0"/>
+          <a:lstStyle/>
+          <a:p>
+            <a:pPr rtl="0"/>
+            <a:r>
+              <a:rPr lang="it-IT" dirty="0"/>
+              <a:t>Svantaggi</a:t>
+            </a:r>
+          </a:p>
+        </p:txBody>
+      </p:sp>
+      <p:sp>
+        <p:nvSpPr>
+          <p:cNvPr id="18" name="Segnaposto contenuto 17">
+            <a:extLst>
+              <a:ext uri="{FF2B5EF4-FFF2-40B4-BE49-F238E27FC236}">
+                <a16:creationId xmlns:a16="http://schemas.microsoft.com/office/drawing/2014/main" id="{C955AFB3-173C-4848-B3E9-1375591B297E}"/>
+              </a:ext>
+            </a:extLst>
+          </p:cNvPr>
+          <p:cNvSpPr>
+            <a:spLocks noGrp="1"/>
+          </p:cNvSpPr>
+          <p:nvPr>
+            <p:ph sz="quarter" idx="15"/>
+          </p:nvPr>
+        </p:nvSpPr>
+        <p:spPr>
+          <a:xfrm>
+            <a:off x="6146706" y="2495482"/>
+            <a:ext cx="5475600" cy="3232149"/>
+          </a:xfrm>
+        </p:spPr>
+        <p:txBody>
+          <a:bodyPr rtlCol="0"/>
+          <a:lstStyle/>
+          <a:p>
+            <a:pPr>
+              <a:buClr>
+                <a:schemeClr val="accent2"/>
+              </a:buClr>
+            </a:pPr>
+            <a:r>
+              <a:rPr lang="it-IT" sz="2000" dirty="0">
+                <a:solidFill>
+                  <a:schemeClr val="tx1"/>
+                </a:solidFill>
+              </a:rPr>
+              <a:t>Il numero delle classi è aumentata (una per ogni comando)</a:t>
+            </a:r>
+            <a:r>
+              <a:rPr lang="it-IT" sz="2000" dirty="0"/>
+              <a:t>St</a:t>
+            </a:r>
+          </a:p>
+          <a:p>
+            <a:pPr>
+              <a:buClr>
+                <a:schemeClr val="accent2"/>
+              </a:buClr>
+            </a:pPr>
+            <a:r>
+              <a:rPr lang="it-IT" sz="2000" dirty="0">
+                <a:solidFill>
+                  <a:schemeClr val="tx1"/>
+                </a:solidFill>
+              </a:rPr>
+              <a:t>Collaborazione tra Strategy e </a:t>
+            </a:r>
+            <a:r>
+              <a:rPr lang="it-IT" sz="2000" dirty="0" err="1">
+                <a:solidFill>
+                  <a:schemeClr val="tx1"/>
+                </a:solidFill>
+              </a:rPr>
+              <a:t>Context</a:t>
+            </a:r>
+            <a:r>
+              <a:rPr lang="it-IT" sz="2000" dirty="0">
+                <a:solidFill>
+                  <a:schemeClr val="tx1"/>
+                </a:solidFill>
+              </a:rPr>
+              <a:t> può </a:t>
+            </a:r>
+            <a:r>
+              <a:rPr lang="it-IT" sz="2000">
+                <a:solidFill>
+                  <a:schemeClr val="tx1"/>
+                </a:solidFill>
+              </a:rPr>
+              <a:t>essere dispendiosa</a:t>
+            </a:r>
+            <a:endParaRPr lang="it-IT" sz="2000" dirty="0">
+              <a:solidFill>
+                <a:schemeClr val="tx1"/>
+              </a:solidFill>
+            </a:endParaRPr>
+          </a:p>
+          <a:p>
+            <a:pPr marL="0" indent="0">
+              <a:buClr>
+                <a:schemeClr val="accent2"/>
+              </a:buClr>
+              <a:buNone/>
+            </a:pPr>
+            <a:r>
+              <a:rPr lang="it-IT" sz="2000" dirty="0" err="1"/>
+              <a:t>rategy</a:t>
+            </a:r>
+            <a:r>
+              <a:rPr lang="it-IT" sz="2000" dirty="0"/>
+              <a:t> disponibili</a:t>
+            </a:r>
+            <a:endParaRPr lang="it-IT" sz="2000" dirty="0">
+              <a:solidFill>
+                <a:schemeClr val="tx1"/>
+              </a:solidFill>
+            </a:endParaRPr>
+          </a:p>
+        </p:txBody>
+      </p:sp>
+      <p:sp>
+        <p:nvSpPr>
+          <p:cNvPr id="19" name="Segnaposto testo 18">
+            <a:extLst>
+              <a:ext uri="{FF2B5EF4-FFF2-40B4-BE49-F238E27FC236}">
+                <a16:creationId xmlns:a16="http://schemas.microsoft.com/office/drawing/2014/main" id="{DFE11F38-F66B-4F95-8224-6CCA69D57617}"/>
+              </a:ext>
+            </a:extLst>
+          </p:cNvPr>
+          <p:cNvSpPr>
+            <a:spLocks noGrp="1"/>
+          </p:cNvSpPr>
+          <p:nvPr>
+            <p:ph type="body" sz="quarter" idx="16"/>
+          </p:nvPr>
+        </p:nvSpPr>
+        <p:spPr/>
+        <p:txBody>
+          <a:bodyPr rtlCol="0">
+            <a:normAutofit/>
+          </a:bodyPr>
+          <a:lstStyle/>
+          <a:p>
+            <a:r>
+              <a:rPr lang="it-IT" dirty="0">
+                <a:solidFill>
+                  <a:schemeClr val="bg2">
+                    <a:lumMod val="50000"/>
+                  </a:schemeClr>
+                </a:solidFill>
+              </a:rPr>
+              <a:t>Pattern </a:t>
+            </a:r>
+            <a:r>
+              <a:rPr lang="it-IT" dirty="0" err="1">
+                <a:solidFill>
+                  <a:schemeClr val="bg2">
+                    <a:lumMod val="50000"/>
+                  </a:schemeClr>
+                </a:solidFill>
+              </a:rPr>
+              <a:t>Gof</a:t>
+            </a:r>
+            <a:endParaRPr lang="it-IT" dirty="0">
+              <a:solidFill>
+                <a:schemeClr val="bg2">
+                  <a:lumMod val="50000"/>
+                </a:schemeClr>
+              </a:solidFill>
+            </a:endParaRPr>
+          </a:p>
+        </p:txBody>
+      </p:sp>
+      <p:sp>
+        <p:nvSpPr>
+          <p:cNvPr id="20" name="Segnaposto piè di pagina 4">
+            <a:extLst>
+              <a:ext uri="{FF2B5EF4-FFF2-40B4-BE49-F238E27FC236}">
+                <a16:creationId xmlns:a16="http://schemas.microsoft.com/office/drawing/2014/main" id="{391D3201-20F9-4DD7-B4EB-F41AF17CA428}"/>
+              </a:ext>
+            </a:extLst>
+          </p:cNvPr>
+          <p:cNvSpPr>
+            <a:spLocks noGrp="1"/>
+          </p:cNvSpPr>
+          <p:nvPr>
+            <p:ph type="ftr" sz="quarter" idx="17"/>
+          </p:nvPr>
+        </p:nvSpPr>
+        <p:spPr/>
+        <p:txBody>
+          <a:bodyPr rtlCol="0"/>
+          <a:lstStyle>
+            <a:lvl1pPr algn="r">
+              <a:defRPr sz="1200">
+                <a:solidFill>
+                  <a:schemeClr val="tx1">
+                    <a:lumMod val="50000"/>
+                    <a:lumOff val="50000"/>
+                  </a:schemeClr>
+                </a:solidFill>
+              </a:defRPr>
+            </a:lvl1pPr>
+          </a:lstStyle>
+          <a:p>
+            <a:pPr algn="l" rtl="0"/>
+            <a:r>
+              <a:rPr lang="it-IT" dirty="0"/>
+              <a:t>Aggiungere un piè di pagina</a:t>
+            </a:r>
+          </a:p>
+        </p:txBody>
+      </p:sp>
+      <p:sp>
+        <p:nvSpPr>
+          <p:cNvPr id="21" name="Segnaposto numero diapositiva 5">
+            <a:extLst>
+              <a:ext uri="{FF2B5EF4-FFF2-40B4-BE49-F238E27FC236}">
+                <a16:creationId xmlns:a16="http://schemas.microsoft.com/office/drawing/2014/main" id="{C7C65DDB-24F2-44CF-AE02-F3A6C8B1858B}"/>
+              </a:ext>
+            </a:extLst>
+          </p:cNvPr>
+          <p:cNvSpPr>
+            <a:spLocks noGrp="1"/>
+          </p:cNvSpPr>
+          <p:nvPr>
+            <p:ph type="sldNum" sz="quarter" idx="18"/>
+          </p:nvPr>
+        </p:nvSpPr>
+        <p:spPr/>
+        <p:txBody>
+          <a:bodyPr rtlCol="0"/>
+          <a:lstStyle>
+            <a:lvl1pPr algn="r">
+              <a:defRPr sz="1200">
+                <a:solidFill>
+                  <a:schemeClr val="tx1">
+                    <a:lumMod val="50000"/>
+                    <a:lumOff val="50000"/>
+                  </a:schemeClr>
+                </a:solidFill>
+              </a:defRPr>
+            </a:lvl1pPr>
+          </a:lstStyle>
+          <a:p>
+            <a:pPr rtl="0"/>
+            <a:fld id="{8699F50C-BE38-4BD0-BA84-9B090E1F2B9B}" type="slidenum">
+              <a:rPr lang="it-IT" smtClean="0"/>
+              <a:pPr rtl="0"/>
+              <a:t>22</a:t>
+            </a:fld>
+            <a:endParaRPr lang="it-IT" dirty="0"/>
+          </a:p>
+        </p:txBody>
+      </p:sp>
+      <p:sp>
+        <p:nvSpPr>
+          <p:cNvPr id="14" name="Titolo 13">
+            <a:extLst>
+              <a:ext uri="{FF2B5EF4-FFF2-40B4-BE49-F238E27FC236}">
+                <a16:creationId xmlns:a16="http://schemas.microsoft.com/office/drawing/2014/main" id="{E3E5EE03-FBF6-46F5-8085-716AC6CE1C8C}"/>
+              </a:ext>
+            </a:extLst>
+          </p:cNvPr>
+          <p:cNvSpPr>
+            <a:spLocks noGrp="1"/>
+          </p:cNvSpPr>
+          <p:nvPr>
+            <p:ph type="title"/>
+          </p:nvPr>
+        </p:nvSpPr>
+        <p:spPr/>
+        <p:txBody>
+          <a:bodyPr rtlCol="0"/>
+          <a:lstStyle/>
+          <a:p>
+            <a:pPr rtl="0"/>
+            <a:r>
+              <a:rPr lang="it-IT" dirty="0">
+                <a:solidFill>
+                  <a:schemeClr val="accent1"/>
+                </a:solidFill>
+              </a:rPr>
+              <a:t>Strategy</a:t>
+            </a:r>
+          </a:p>
+        </p:txBody>
+      </p:sp>
+    </p:spTree>
+    <p:extLst>
+      <p:ext uri="{BB962C8B-B14F-4D97-AF65-F5344CB8AC3E}">
+        <p14:creationId xmlns:p14="http://schemas.microsoft.com/office/powerpoint/2010/main" val="770092439"/>
       </p:ext>
     </p:extLst>
   </p:cSld>
@@ -22877,4 +23771,47 @@
     </a:folHlink>
   </a:clrScheme>
 </a:themeOverride>
+</file>
+
+<file path=ppt/theme/themeOverride3.xml><?xml version="1.0" encoding="utf-8"?>
+<a:themeOverride xmlns:a="http://schemas.openxmlformats.org/drawingml/2006/main">
+  <a:clrScheme name="Office">
+    <a:dk1>
+      <a:sysClr val="windowText" lastClr="000000"/>
+    </a:dk1>
+    <a:lt1>
+      <a:sysClr val="window" lastClr="FFFFFF"/>
+    </a:lt1>
+    <a:dk2>
+      <a:srgbClr val="44546A"/>
+    </a:dk2>
+    <a:lt2>
+      <a:srgbClr val="E7E6E6"/>
+    </a:lt2>
+    <a:accent1>
+      <a:srgbClr val="4472C4"/>
+    </a:accent1>
+    <a:accent2>
+      <a:srgbClr val="ED7D31"/>
+    </a:accent2>
+    <a:accent3>
+      <a:srgbClr val="A5A5A5"/>
+    </a:accent3>
+    <a:accent4>
+      <a:srgbClr val="FFC000"/>
+    </a:accent4>
+    <a:accent5>
+      <a:srgbClr val="5B9BD5"/>
+    </a:accent5>
+    <a:accent6>
+      <a:srgbClr val="70AD47"/>
+    </a:accent6>
+    <a:hlink>
+      <a:srgbClr val="0563C1"/>
+    </a:hlink>
+    <a:folHlink>
+      <a:srgbClr val="954F72"/>
+    </a:folHlink>
+  </a:clrScheme>
+</a:themeOverride>
 </file>
</xml_diff>